<commit_message>
Progress edit P2C2 parameter concept.
</commit_message>
<xml_diff>
--- a/resources/ppt-slides/parameters.pptx
+++ b/resources/ppt-slides/parameters.pptx
@@ -253,7 +253,7 @@
           <a:p>
             <a:fld id="{964302DC-9F53-934F-AE4D-0F1F197008C1}" type="datetimeFigureOut">
               <a:rPr lang="en-US" smtClean="0"/>
-              <a:t>11/21/23</a:t>
+              <a:t>2/20/24</a:t>
             </a:fld>
             <a:endParaRPr lang="en-US"/>
           </a:p>
@@ -423,7 +423,7 @@
           <a:p>
             <a:fld id="{964302DC-9F53-934F-AE4D-0F1F197008C1}" type="datetimeFigureOut">
               <a:rPr lang="en-US" smtClean="0"/>
-              <a:t>11/21/23</a:t>
+              <a:t>2/20/24</a:t>
             </a:fld>
             <a:endParaRPr lang="en-US"/>
           </a:p>
@@ -603,7 +603,7 @@
           <a:p>
             <a:fld id="{964302DC-9F53-934F-AE4D-0F1F197008C1}" type="datetimeFigureOut">
               <a:rPr lang="en-US" smtClean="0"/>
-              <a:t>11/21/23</a:t>
+              <a:t>2/20/24</a:t>
             </a:fld>
             <a:endParaRPr lang="en-US"/>
           </a:p>
@@ -773,7 +773,7 @@
           <a:p>
             <a:fld id="{964302DC-9F53-934F-AE4D-0F1F197008C1}" type="datetimeFigureOut">
               <a:rPr lang="en-US" smtClean="0"/>
-              <a:t>11/21/23</a:t>
+              <a:t>2/20/24</a:t>
             </a:fld>
             <a:endParaRPr lang="en-US"/>
           </a:p>
@@ -1017,7 +1017,7 @@
           <a:p>
             <a:fld id="{964302DC-9F53-934F-AE4D-0F1F197008C1}" type="datetimeFigureOut">
               <a:rPr lang="en-US" smtClean="0"/>
-              <a:t>11/21/23</a:t>
+              <a:t>2/20/24</a:t>
             </a:fld>
             <a:endParaRPr lang="en-US"/>
           </a:p>
@@ -1249,7 +1249,7 @@
           <a:p>
             <a:fld id="{964302DC-9F53-934F-AE4D-0F1F197008C1}" type="datetimeFigureOut">
               <a:rPr lang="en-US" smtClean="0"/>
-              <a:t>11/21/23</a:t>
+              <a:t>2/20/24</a:t>
             </a:fld>
             <a:endParaRPr lang="en-US"/>
           </a:p>
@@ -1616,7 +1616,7 @@
           <a:p>
             <a:fld id="{964302DC-9F53-934F-AE4D-0F1F197008C1}" type="datetimeFigureOut">
               <a:rPr lang="en-US" smtClean="0"/>
-              <a:t>11/21/23</a:t>
+              <a:t>2/20/24</a:t>
             </a:fld>
             <a:endParaRPr lang="en-US"/>
           </a:p>
@@ -1734,7 +1734,7 @@
           <a:p>
             <a:fld id="{964302DC-9F53-934F-AE4D-0F1F197008C1}" type="datetimeFigureOut">
               <a:rPr lang="en-US" smtClean="0"/>
-              <a:t>11/21/23</a:t>
+              <a:t>2/20/24</a:t>
             </a:fld>
             <a:endParaRPr lang="en-US"/>
           </a:p>
@@ -1829,7 +1829,7 @@
           <a:p>
             <a:fld id="{964302DC-9F53-934F-AE4D-0F1F197008C1}" type="datetimeFigureOut">
               <a:rPr lang="en-US" smtClean="0"/>
-              <a:t>11/21/23</a:t>
+              <a:t>2/20/24</a:t>
             </a:fld>
             <a:endParaRPr lang="en-US"/>
           </a:p>
@@ -2106,7 +2106,7 @@
           <a:p>
             <a:fld id="{964302DC-9F53-934F-AE4D-0F1F197008C1}" type="datetimeFigureOut">
               <a:rPr lang="en-US" smtClean="0"/>
-              <a:t>11/21/23</a:t>
+              <a:t>2/20/24</a:t>
             </a:fld>
             <a:endParaRPr lang="en-US"/>
           </a:p>
@@ -2363,7 +2363,7 @@
           <a:p>
             <a:fld id="{964302DC-9F53-934F-AE4D-0F1F197008C1}" type="datetimeFigureOut">
               <a:rPr lang="en-US" smtClean="0"/>
-              <a:t>11/21/23</a:t>
+              <a:t>2/20/24</a:t>
             </a:fld>
             <a:endParaRPr lang="en-US"/>
           </a:p>
@@ -2428,9 +2428,18 @@
 <p:sldMaster xmlns:a="http://schemas.openxmlformats.org/drawingml/2006/main" xmlns:r="http://schemas.openxmlformats.org/officeDocument/2006/relationships" xmlns:p="http://schemas.openxmlformats.org/presentationml/2006/main">
   <p:cSld>
     <p:bg>
-      <p:bgRef idx="1001">
-        <a:schemeClr val="bg1"/>
-      </p:bgRef>
+      <p:bgPr>
+        <a:blipFill dpi="0" rotWithShape="1">
+          <a:blip r:embed="rId13">
+            <a:lum/>
+          </a:blip>
+          <a:srcRect/>
+          <a:stretch>
+            <a:fillRect/>
+          </a:stretch>
+        </a:blipFill>
+        <a:effectLst/>
+      </p:bgPr>
     </p:bg>
     <p:spTree>
       <p:nvGrpSpPr>
@@ -2576,7 +2585,7 @@
           <a:p>
             <a:fld id="{964302DC-9F53-934F-AE4D-0F1F197008C1}" type="datetimeFigureOut">
               <a:rPr lang="en-US" smtClean="0"/>
-              <a:t>11/21/23</a:t>
+              <a:t>2/20/24</a:t>
             </a:fld>
             <a:endParaRPr lang="en-US"/>
           </a:p>
@@ -2967,20 +2976,6 @@
 <file path=ppt/slides/slide1.xml><?xml version="1.0" encoding="utf-8"?>
 <p:sld xmlns:a="http://schemas.openxmlformats.org/drawingml/2006/main" xmlns:r="http://schemas.openxmlformats.org/officeDocument/2006/relationships" xmlns:p="http://schemas.openxmlformats.org/presentationml/2006/main">
   <p:cSld>
-    <p:bg>
-      <p:bgPr>
-        <a:blipFill dpi="0" rotWithShape="1">
-          <a:blip r:embed="rId2">
-            <a:lum/>
-          </a:blip>
-          <a:srcRect/>
-          <a:stretch>
-            <a:fillRect/>
-          </a:stretch>
-        </a:blipFill>
-        <a:effectLst/>
-      </p:bgPr>
-    </p:bg>
     <p:spTree>
       <p:nvGrpSpPr>
         <p:cNvPr id="1" name=""/>
@@ -3069,7 +3064,7 @@
               </a:pPr>
               <a:r>
                 <a:rPr lang="en-AU" sz="1200" dirty="0"/>
-                <a:t>  </a:t>
+                <a:t>    </a:t>
               </a:r>
               <a:r>
                 <a:rPr lang="en-AU" sz="1200" dirty="0" err="1"/>
@@ -3093,7 +3088,7 @@
                     </a:schemeClr>
                   </a:solidFill>
                 </a:rPr>
-                <a:t>  </a:t>
+                <a:t>    </a:t>
               </a:r>
               <a:r>
                 <a:rPr lang="en-AU" sz="1200" dirty="0" err="1">
@@ -3129,7 +3124,7 @@
                     </a:schemeClr>
                   </a:solidFill>
                 </a:rPr>
-                <a:t>  return 0;</a:t>
+                <a:t>    return 0;</a:t>
               </a:r>
             </a:p>
             <a:p>
@@ -3226,7 +3221,7 @@
                     </a:schemeClr>
                   </a:solidFill>
                 </a:rPr>
-                <a:t>  double solution = m * x + c;</a:t>
+                <a:t>    double solution = m * x + c;</a:t>
               </a:r>
             </a:p>
             <a:p>
@@ -3242,7 +3237,7 @@
                     </a:schemeClr>
                   </a:solidFill>
                 </a:rPr>
-                <a:t>  </a:t>
+                <a:t>    </a:t>
               </a:r>
               <a:r>
                 <a:rPr lang="en-AU" sz="1200" dirty="0" err="1">
@@ -3322,7 +3317,26 @@
                     </a:schemeClr>
                   </a:solidFill>
                 </a:rPr>
-                <a:t>(c) + " = " + </a:t>
+                <a:t>(c) + " =        </a:t>
+              </a:r>
+              <a:br>
+                <a:rPr lang="en-AU" sz="1200" dirty="0">
+                  <a:solidFill>
+                    <a:schemeClr val="bg1">
+                      <a:lumMod val="65000"/>
+                    </a:schemeClr>
+                  </a:solidFill>
+                </a:rPr>
+              </a:br>
+              <a:r>
+                <a:rPr lang="en-AU" sz="1200" dirty="0">
+                  <a:solidFill>
+                    <a:schemeClr val="bg1">
+                      <a:lumMod val="65000"/>
+                    </a:schemeClr>
+                  </a:solidFill>
+                </a:rPr>
+                <a:t>    " + </a:t>
               </a:r>
               <a:r>
                 <a:rPr lang="en-AU" sz="1200" dirty="0" err="1">
@@ -3398,7 +3412,7 @@
               <p:nvPr/>
             </p:nvPicPr>
             <p:blipFill>
-              <a:blip r:embed="rId3">
+              <a:blip r:embed="rId2">
                 <a:alphaModFix/>
               </a:blip>
               <a:stretch>
@@ -5198,7 +5212,7 @@
             <p:nvPr/>
           </p:nvPicPr>
           <p:blipFill>
-            <a:blip r:embed="rId4">
+            <a:blip r:embed="rId3">
               <a:alphaModFix amt="30000"/>
             </a:blip>
             <a:stretch>
@@ -5388,20 +5402,6 @@
 <file path=ppt/slides/slide10.xml><?xml version="1.0" encoding="utf-8"?>
 <p:sld xmlns:a="http://schemas.openxmlformats.org/drawingml/2006/main" xmlns:r="http://schemas.openxmlformats.org/officeDocument/2006/relationships" xmlns:p="http://schemas.openxmlformats.org/presentationml/2006/main">
   <p:cSld>
-    <p:bg>
-      <p:bgPr>
-        <a:blipFill dpi="0" rotWithShape="1">
-          <a:blip r:embed="rId2">
-            <a:lum/>
-          </a:blip>
-          <a:srcRect/>
-          <a:stretch>
-            <a:fillRect/>
-          </a:stretch>
-        </a:blipFill>
-        <a:effectLst/>
-      </p:bgPr>
-    </p:bg>
     <p:spTree>
       <p:nvGrpSpPr>
         <p:cNvPr id="1" name=""/>
@@ -5754,7 +5754,7 @@
                     </a:schemeClr>
                   </a:solidFill>
                 </a:rPr>
-                <a:t>  </a:t>
+                <a:t>    </a:t>
               </a:r>
               <a:r>
                 <a:rPr lang="en-AU" sz="1200" dirty="0" err="1">
@@ -5784,7 +5784,7 @@
               </a:pPr>
               <a:r>
                 <a:rPr lang="en-AU" sz="1200" dirty="0"/>
-                <a:t>  </a:t>
+                <a:t>    </a:t>
               </a:r>
               <a:r>
                 <a:rPr lang="en-AU" sz="1200" dirty="0" err="1"/>
@@ -5808,7 +5808,7 @@
                     </a:schemeClr>
                   </a:solidFill>
                 </a:rPr>
-                <a:t>  return 0;</a:t>
+                <a:t>    return 0;</a:t>
               </a:r>
             </a:p>
             <a:p>
@@ -5905,7 +5905,7 @@
                     </a:schemeClr>
                   </a:solidFill>
                 </a:rPr>
-                <a:t>  double solution = m * x + c;</a:t>
+                <a:t>    double solution = m * x + c;</a:t>
               </a:r>
             </a:p>
             <a:p>
@@ -5921,7 +5921,7 @@
                     </a:schemeClr>
                   </a:solidFill>
                 </a:rPr>
-                <a:t>  </a:t>
+                <a:t>    </a:t>
               </a:r>
               <a:r>
                 <a:rPr lang="en-AU" sz="1200" dirty="0" err="1">
@@ -6001,7 +6001,26 @@
                     </a:schemeClr>
                   </a:solidFill>
                 </a:rPr>
-                <a:t>(c) + " = " + </a:t>
+                <a:t>(c) + " = </a:t>
+              </a:r>
+              <a:br>
+                <a:rPr lang="en-AU" sz="1200" dirty="0">
+                  <a:solidFill>
+                    <a:schemeClr val="bg1">
+                      <a:lumMod val="65000"/>
+                    </a:schemeClr>
+                  </a:solidFill>
+                </a:rPr>
+              </a:br>
+              <a:r>
+                <a:rPr lang="en-AU" sz="1200" dirty="0">
+                  <a:solidFill>
+                    <a:schemeClr val="bg1">
+                      <a:lumMod val="65000"/>
+                    </a:schemeClr>
+                  </a:solidFill>
+                </a:rPr>
+                <a:t>    " + </a:t>
               </a:r>
               <a:r>
                 <a:rPr lang="en-AU" sz="1200" dirty="0" err="1">
@@ -6071,7 +6090,7 @@
               <p:nvPr/>
             </p:nvPicPr>
             <p:blipFill>
-              <a:blip r:embed="rId3">
+              <a:blip r:embed="rId2">
                 <a:alphaModFix/>
               </a:blip>
               <a:stretch>
@@ -7850,9 +7869,10 @@
             <a:lstStyle/>
             <a:p>
               <a:r>
-                <a:rPr lang="en-US" dirty="0"/>
-                <a:t>5</a:t>
-              </a:r>
+                <a:rPr lang="en-US"/>
+                <a:t>4,5</a:t>
+              </a:r>
+              <a:endParaRPr lang="en-US" dirty="0"/>
             </a:p>
           </p:txBody>
         </p:sp>
@@ -7871,7 +7891,7 @@
             <p:nvPr/>
           </p:nvPicPr>
           <p:blipFill>
-            <a:blip r:embed="rId4">
+            <a:blip r:embed="rId3">
               <a:alphaModFix amt="30000"/>
             </a:blip>
             <a:stretch>
@@ -9112,20 +9132,6 @@
 <file path=ppt/slides/slide11.xml><?xml version="1.0" encoding="utf-8"?>
 <p:sld xmlns:a="http://schemas.openxmlformats.org/drawingml/2006/main" xmlns:r="http://schemas.openxmlformats.org/officeDocument/2006/relationships" xmlns:p="http://schemas.openxmlformats.org/presentationml/2006/main">
   <p:cSld>
-    <p:bg>
-      <p:bgPr>
-        <a:blipFill dpi="0" rotWithShape="1">
-          <a:blip r:embed="rId2">
-            <a:lum/>
-          </a:blip>
-          <a:srcRect/>
-          <a:stretch>
-            <a:fillRect/>
-          </a:stretch>
-        </a:blipFill>
-        <a:effectLst/>
-      </p:bgPr>
-    </p:bg>
     <p:spTree>
       <p:nvGrpSpPr>
         <p:cNvPr id="1" name=""/>
@@ -9232,7 +9238,7 @@
                     </a:schemeClr>
                   </a:solidFill>
                 </a:rPr>
-                <a:t>  </a:t>
+                <a:t>    </a:t>
               </a:r>
               <a:r>
                 <a:rPr lang="en-AU" sz="1200" dirty="0" err="1">
@@ -9268,7 +9274,7 @@
                     </a:schemeClr>
                   </a:solidFill>
                 </a:rPr>
-                <a:t>  </a:t>
+                <a:t>    </a:t>
               </a:r>
               <a:r>
                 <a:rPr lang="en-AU" sz="1200" dirty="0" err="1">
@@ -9298,7 +9304,7 @@
               </a:pPr>
               <a:r>
                 <a:rPr lang="en-AU" sz="1200" dirty="0"/>
-                <a:t>  return 0;</a:t>
+                <a:t>    return 0;</a:t>
               </a:r>
             </a:p>
             <a:p>
@@ -9395,7 +9401,7 @@
                     </a:schemeClr>
                   </a:solidFill>
                 </a:rPr>
-                <a:t>  double solution = m * x + c;</a:t>
+                <a:t>    double solution = m * x + c;</a:t>
               </a:r>
             </a:p>
             <a:p>
@@ -9411,7 +9417,7 @@
                     </a:schemeClr>
                   </a:solidFill>
                 </a:rPr>
-                <a:t>  </a:t>
+                <a:t>    </a:t>
               </a:r>
               <a:r>
                 <a:rPr lang="en-AU" sz="1200" dirty="0" err="1">
@@ -9491,7 +9497,46 @@
                     </a:schemeClr>
                   </a:solidFill>
                 </a:rPr>
-                <a:t>(c) + " = " + </a:t>
+                <a:t>(c) + " </a:t>
+              </a:r>
+              <a:r>
+                <a:rPr lang="en-AU" sz="1200">
+                  <a:solidFill>
+                    <a:schemeClr val="bg1">
+                      <a:lumMod val="65000"/>
+                    </a:schemeClr>
+                  </a:solidFill>
+                </a:rPr>
+                <a:t>= </a:t>
+              </a:r>
+              <a:br>
+                <a:rPr lang="en-AU" sz="1200">
+                  <a:solidFill>
+                    <a:schemeClr val="bg1">
+                      <a:lumMod val="65000"/>
+                    </a:schemeClr>
+                  </a:solidFill>
+                </a:rPr>
+              </a:br>
+              <a:r>
+                <a:rPr lang="en-AU" sz="1200">
+                  <a:solidFill>
+                    <a:schemeClr val="bg1">
+                      <a:lumMod val="65000"/>
+                    </a:schemeClr>
+                  </a:solidFill>
+                </a:rPr>
+                <a:t>    " </a:t>
+              </a:r>
+              <a:r>
+                <a:rPr lang="en-AU" sz="1200" dirty="0">
+                  <a:solidFill>
+                    <a:schemeClr val="bg1">
+                      <a:lumMod val="65000"/>
+                    </a:schemeClr>
+                  </a:solidFill>
+                </a:rPr>
+                <a:t>+ </a:t>
               </a:r>
               <a:r>
                 <a:rPr lang="en-AU" sz="1200" dirty="0" err="1">
@@ -9567,7 +9612,7 @@
               <p:nvPr/>
             </p:nvPicPr>
             <p:blipFill>
-              <a:blip r:embed="rId3">
+              <a:blip r:embed="rId2">
                 <a:alphaModFix/>
               </a:blip>
               <a:stretch>
@@ -11367,7 +11412,7 @@
             <p:nvPr/>
           </p:nvPicPr>
           <p:blipFill>
-            <a:blip r:embed="rId4">
+            <a:blip r:embed="rId3">
               <a:alphaModFix amt="30000"/>
             </a:blip>
             <a:stretch>
@@ -11610,20 +11655,6 @@
 <file path=ppt/slides/slide2.xml><?xml version="1.0" encoding="utf-8"?>
 <p:sld xmlns:a="http://schemas.openxmlformats.org/drawingml/2006/main" xmlns:r="http://schemas.openxmlformats.org/officeDocument/2006/relationships" xmlns:p="http://schemas.openxmlformats.org/presentationml/2006/main">
   <p:cSld>
-    <p:bg>
-      <p:bgPr>
-        <a:blipFill dpi="0" rotWithShape="1">
-          <a:blip r:embed="rId2">
-            <a:lum/>
-          </a:blip>
-          <a:srcRect/>
-          <a:stretch>
-            <a:fillRect/>
-          </a:stretch>
-        </a:blipFill>
-        <a:effectLst/>
-      </p:bgPr>
-    </p:bg>
     <p:spTree>
       <p:nvGrpSpPr>
         <p:cNvPr id="1" name=""/>
@@ -11724,7 +11755,7 @@
               </a:pPr>
               <a:r>
                 <a:rPr lang="en-AU" sz="1200" dirty="0"/>
-                <a:t>  </a:t>
+                <a:t>    </a:t>
               </a:r>
               <a:r>
                 <a:rPr lang="en-AU" sz="1200" dirty="0" err="1"/>
@@ -11748,7 +11779,7 @@
                     </a:schemeClr>
                   </a:solidFill>
                 </a:rPr>
-                <a:t>  </a:t>
+                <a:t>    </a:t>
               </a:r>
               <a:r>
                 <a:rPr lang="en-AU" sz="1200" dirty="0" err="1">
@@ -11784,7 +11815,7 @@
                     </a:schemeClr>
                   </a:solidFill>
                 </a:rPr>
-                <a:t>  return 0;</a:t>
+                <a:t>    return 0;</a:t>
               </a:r>
             </a:p>
             <a:p>
@@ -11857,7 +11888,7 @@
                     </a:schemeClr>
                   </a:solidFill>
                 </a:rPr>
-                <a:t>  double solution = m * x + c;</a:t>
+                <a:t>    double solution = m * x + c;</a:t>
               </a:r>
             </a:p>
             <a:p>
@@ -11873,7 +11904,7 @@
                     </a:schemeClr>
                   </a:solidFill>
                 </a:rPr>
-                <a:t>  </a:t>
+                <a:t>    </a:t>
               </a:r>
               <a:r>
                 <a:rPr lang="en-AU" sz="1200" dirty="0" err="1">
@@ -11953,7 +11984,26 @@
                     </a:schemeClr>
                   </a:solidFill>
                 </a:rPr>
-                <a:t>(c) + " = " + </a:t>
+                <a:t>(c) + " = </a:t>
+              </a:r>
+              <a:br>
+                <a:rPr lang="en-AU" sz="1200" dirty="0">
+                  <a:solidFill>
+                    <a:schemeClr val="bg1">
+                      <a:lumMod val="65000"/>
+                    </a:schemeClr>
+                  </a:solidFill>
+                </a:rPr>
+              </a:br>
+              <a:r>
+                <a:rPr lang="en-AU" sz="1200" dirty="0">
+                  <a:solidFill>
+                    <a:schemeClr val="bg1">
+                      <a:lumMod val="65000"/>
+                    </a:schemeClr>
+                  </a:solidFill>
+                </a:rPr>
+                <a:t>    " + </a:t>
               </a:r>
               <a:r>
                 <a:rPr lang="en-AU" sz="1200" dirty="0" err="1">
@@ -12029,7 +12079,7 @@
               <p:nvPr/>
             </p:nvPicPr>
             <p:blipFill>
-              <a:blip r:embed="rId3">
+              <a:blip r:embed="rId2">
                 <a:alphaModFix/>
               </a:blip>
               <a:stretch>
@@ -13481,7 +13531,7 @@
               <a:pPr algn="ctr"/>
               <a:r>
                 <a:rPr lang="en-US" dirty="0"/>
-                <a:t>7,8</a:t>
+                <a:t>7</a:t>
               </a:r>
             </a:p>
           </p:txBody>
@@ -13809,7 +13859,7 @@
             <a:p>
               <a:r>
                 <a:rPr lang="en-US" dirty="0"/>
-                <a:t>9</a:t>
+                <a:t>8,9</a:t>
               </a:r>
             </a:p>
           </p:txBody>
@@ -13829,7 +13879,7 @@
             <p:nvPr/>
           </p:nvPicPr>
           <p:blipFill>
-            <a:blip r:embed="rId4">
+            <a:blip r:embed="rId3">
               <a:alphaModFix amt="30000"/>
             </a:blip>
             <a:stretch>
@@ -14079,19 +14129,19 @@
               <a:avLst/>
               <a:gdLst>
                 <a:gd name="connsiteX0" fmla="*/ 0 w 873322"/>
-                <a:gd name="connsiteY0" fmla="*/ 0 h 267461"/>
+                <a:gd name="connsiteY0" fmla="*/ 0 h 255160"/>
                 <a:gd name="connsiteX1" fmla="*/ 427928 w 873322"/>
-                <a:gd name="connsiteY1" fmla="*/ 0 h 267461"/>
+                <a:gd name="connsiteY1" fmla="*/ 0 h 255160"/>
                 <a:gd name="connsiteX2" fmla="*/ 873322 w 873322"/>
-                <a:gd name="connsiteY2" fmla="*/ 0 h 267461"/>
+                <a:gd name="connsiteY2" fmla="*/ 0 h 255160"/>
                 <a:gd name="connsiteX3" fmla="*/ 873322 w 873322"/>
-                <a:gd name="connsiteY3" fmla="*/ 267461 h 267461"/>
+                <a:gd name="connsiteY3" fmla="*/ 255160 h 255160"/>
                 <a:gd name="connsiteX4" fmla="*/ 436661 w 873322"/>
-                <a:gd name="connsiteY4" fmla="*/ 267461 h 267461"/>
+                <a:gd name="connsiteY4" fmla="*/ 255160 h 255160"/>
                 <a:gd name="connsiteX5" fmla="*/ 0 w 873322"/>
-                <a:gd name="connsiteY5" fmla="*/ 267461 h 267461"/>
+                <a:gd name="connsiteY5" fmla="*/ 255160 h 255160"/>
                 <a:gd name="connsiteX6" fmla="*/ 0 w 873322"/>
-                <a:gd name="connsiteY6" fmla="*/ 0 h 267461"/>
+                <a:gd name="connsiteY6" fmla="*/ 0 h 255160"/>
               </a:gdLst>
               <a:ahLst/>
               <a:cxnLst>
@@ -14119,7 +14169,7 @@
               </a:cxnLst>
               <a:rect l="l" t="t" r="r" b="b"/>
               <a:pathLst>
-                <a:path w="873322" h="267461" extrusionOk="0">
+                <a:path w="873322" h="255160" extrusionOk="0">
                   <a:moveTo>
                     <a:pt x="0" y="0"/>
                   </a:moveTo>
@@ -14134,23 +14184,23 @@
                     <a:pt x="873322" y="0"/>
                   </a:cubicBezTo>
                   <a:cubicBezTo>
-                    <a:pt x="862239" y="124005"/>
-                    <a:pt x="880850" y="185332"/>
-                    <a:pt x="873322" y="267461"/>
+                    <a:pt x="880491" y="92628"/>
+                    <a:pt x="860819" y="134873"/>
+                    <a:pt x="873322" y="255160"/>
                   </a:cubicBezTo>
                   <a:cubicBezTo>
-                    <a:pt x="663264" y="261853"/>
-                    <a:pt x="553837" y="255596"/>
-                    <a:pt x="436661" y="267461"/>
+                    <a:pt x="663264" y="249552"/>
+                    <a:pt x="553837" y="243295"/>
+                    <a:pt x="436661" y="255160"/>
                   </a:cubicBezTo>
                   <a:cubicBezTo>
-                    <a:pt x="319485" y="279326"/>
-                    <a:pt x="104497" y="247260"/>
-                    <a:pt x="0" y="267461"/>
+                    <a:pt x="319485" y="267025"/>
+                    <a:pt x="104497" y="234959"/>
+                    <a:pt x="0" y="255160"/>
                   </a:cubicBezTo>
                   <a:cubicBezTo>
-                    <a:pt x="-3232" y="158525"/>
-                    <a:pt x="7541" y="131195"/>
+                    <a:pt x="1213" y="176212"/>
+                    <a:pt x="12113" y="55285"/>
                     <a:pt x="0" y="0"/>
                   </a:cubicBezTo>
                   <a:close/>
@@ -14456,19 +14506,19 @@
               <a:avLst/>
               <a:gdLst>
                 <a:gd name="connsiteX0" fmla="*/ 0 w 873322"/>
-                <a:gd name="connsiteY0" fmla="*/ 0 h 267461"/>
+                <a:gd name="connsiteY0" fmla="*/ 0 h 255160"/>
                 <a:gd name="connsiteX1" fmla="*/ 427928 w 873322"/>
-                <a:gd name="connsiteY1" fmla="*/ 0 h 267461"/>
+                <a:gd name="connsiteY1" fmla="*/ 0 h 255160"/>
                 <a:gd name="connsiteX2" fmla="*/ 873322 w 873322"/>
-                <a:gd name="connsiteY2" fmla="*/ 0 h 267461"/>
+                <a:gd name="connsiteY2" fmla="*/ 0 h 255160"/>
                 <a:gd name="connsiteX3" fmla="*/ 873322 w 873322"/>
-                <a:gd name="connsiteY3" fmla="*/ 267461 h 267461"/>
+                <a:gd name="connsiteY3" fmla="*/ 255160 h 255160"/>
                 <a:gd name="connsiteX4" fmla="*/ 436661 w 873322"/>
-                <a:gd name="connsiteY4" fmla="*/ 267461 h 267461"/>
+                <a:gd name="connsiteY4" fmla="*/ 255160 h 255160"/>
                 <a:gd name="connsiteX5" fmla="*/ 0 w 873322"/>
-                <a:gd name="connsiteY5" fmla="*/ 267461 h 267461"/>
+                <a:gd name="connsiteY5" fmla="*/ 255160 h 255160"/>
                 <a:gd name="connsiteX6" fmla="*/ 0 w 873322"/>
-                <a:gd name="connsiteY6" fmla="*/ 0 h 267461"/>
+                <a:gd name="connsiteY6" fmla="*/ 0 h 255160"/>
               </a:gdLst>
               <a:ahLst/>
               <a:cxnLst>
@@ -14496,7 +14546,7 @@
               </a:cxnLst>
               <a:rect l="l" t="t" r="r" b="b"/>
               <a:pathLst>
-                <a:path w="873322" h="267461" extrusionOk="0">
+                <a:path w="873322" h="255160" extrusionOk="0">
                   <a:moveTo>
                     <a:pt x="0" y="0"/>
                   </a:moveTo>
@@ -14511,23 +14561,23 @@
                     <a:pt x="873322" y="0"/>
                   </a:cubicBezTo>
                   <a:cubicBezTo>
-                    <a:pt x="862239" y="124005"/>
-                    <a:pt x="880850" y="185332"/>
-                    <a:pt x="873322" y="267461"/>
+                    <a:pt x="880491" y="92628"/>
+                    <a:pt x="860819" y="134873"/>
+                    <a:pt x="873322" y="255160"/>
                   </a:cubicBezTo>
                   <a:cubicBezTo>
-                    <a:pt x="663264" y="261853"/>
-                    <a:pt x="553837" y="255596"/>
-                    <a:pt x="436661" y="267461"/>
+                    <a:pt x="663264" y="249552"/>
+                    <a:pt x="553837" y="243295"/>
+                    <a:pt x="436661" y="255160"/>
                   </a:cubicBezTo>
                   <a:cubicBezTo>
-                    <a:pt x="319485" y="279326"/>
-                    <a:pt x="104497" y="247260"/>
-                    <a:pt x="0" y="267461"/>
+                    <a:pt x="319485" y="267025"/>
+                    <a:pt x="104497" y="234959"/>
+                    <a:pt x="0" y="255160"/>
                   </a:cubicBezTo>
                   <a:cubicBezTo>
-                    <a:pt x="-3232" y="158525"/>
-                    <a:pt x="7541" y="131195"/>
+                    <a:pt x="1213" y="176212"/>
+                    <a:pt x="12113" y="55285"/>
                     <a:pt x="0" y="0"/>
                   </a:cubicBezTo>
                   <a:close/>
@@ -14690,19 +14740,19 @@
               <a:avLst/>
               <a:gdLst>
                 <a:gd name="connsiteX0" fmla="*/ 0 w 873322"/>
-                <a:gd name="connsiteY0" fmla="*/ 0 h 267461"/>
+                <a:gd name="connsiteY0" fmla="*/ 0 h 255160"/>
                 <a:gd name="connsiteX1" fmla="*/ 427928 w 873322"/>
-                <a:gd name="connsiteY1" fmla="*/ 0 h 267461"/>
+                <a:gd name="connsiteY1" fmla="*/ 0 h 255160"/>
                 <a:gd name="connsiteX2" fmla="*/ 873322 w 873322"/>
-                <a:gd name="connsiteY2" fmla="*/ 0 h 267461"/>
+                <a:gd name="connsiteY2" fmla="*/ 0 h 255160"/>
                 <a:gd name="connsiteX3" fmla="*/ 873322 w 873322"/>
-                <a:gd name="connsiteY3" fmla="*/ 267461 h 267461"/>
+                <a:gd name="connsiteY3" fmla="*/ 255160 h 255160"/>
                 <a:gd name="connsiteX4" fmla="*/ 436661 w 873322"/>
-                <a:gd name="connsiteY4" fmla="*/ 267461 h 267461"/>
+                <a:gd name="connsiteY4" fmla="*/ 255160 h 255160"/>
                 <a:gd name="connsiteX5" fmla="*/ 0 w 873322"/>
-                <a:gd name="connsiteY5" fmla="*/ 267461 h 267461"/>
+                <a:gd name="connsiteY5" fmla="*/ 255160 h 255160"/>
                 <a:gd name="connsiteX6" fmla="*/ 0 w 873322"/>
-                <a:gd name="connsiteY6" fmla="*/ 0 h 267461"/>
+                <a:gd name="connsiteY6" fmla="*/ 0 h 255160"/>
               </a:gdLst>
               <a:ahLst/>
               <a:cxnLst>
@@ -14730,7 +14780,7 @@
               </a:cxnLst>
               <a:rect l="l" t="t" r="r" b="b"/>
               <a:pathLst>
-                <a:path w="873322" h="267461" extrusionOk="0">
+                <a:path w="873322" h="255160" extrusionOk="0">
                   <a:moveTo>
                     <a:pt x="0" y="0"/>
                   </a:moveTo>
@@ -14745,23 +14795,23 @@
                     <a:pt x="873322" y="0"/>
                   </a:cubicBezTo>
                   <a:cubicBezTo>
-                    <a:pt x="862239" y="124005"/>
-                    <a:pt x="880850" y="185332"/>
-                    <a:pt x="873322" y="267461"/>
+                    <a:pt x="880491" y="92628"/>
+                    <a:pt x="860819" y="134873"/>
+                    <a:pt x="873322" y="255160"/>
                   </a:cubicBezTo>
                   <a:cubicBezTo>
-                    <a:pt x="663264" y="261853"/>
-                    <a:pt x="553837" y="255596"/>
-                    <a:pt x="436661" y="267461"/>
+                    <a:pt x="663264" y="249552"/>
+                    <a:pt x="553837" y="243295"/>
+                    <a:pt x="436661" y="255160"/>
                   </a:cubicBezTo>
                   <a:cubicBezTo>
-                    <a:pt x="319485" y="279326"/>
-                    <a:pt x="104497" y="247260"/>
-                    <a:pt x="0" y="267461"/>
+                    <a:pt x="319485" y="267025"/>
+                    <a:pt x="104497" y="234959"/>
+                    <a:pt x="0" y="255160"/>
                   </a:cubicBezTo>
                   <a:cubicBezTo>
-                    <a:pt x="-3232" y="158525"/>
-                    <a:pt x="7541" y="131195"/>
+                    <a:pt x="1213" y="176212"/>
+                    <a:pt x="12113" y="55285"/>
                     <a:pt x="0" y="0"/>
                   </a:cubicBezTo>
                   <a:close/>
@@ -14864,20 +14914,6 @@
 <file path=ppt/slides/slide3.xml><?xml version="1.0" encoding="utf-8"?>
 <p:sld xmlns:a="http://schemas.openxmlformats.org/drawingml/2006/main" xmlns:r="http://schemas.openxmlformats.org/officeDocument/2006/relationships" xmlns:p="http://schemas.openxmlformats.org/presentationml/2006/main">
   <p:cSld>
-    <p:bg>
-      <p:bgPr>
-        <a:blipFill dpi="0" rotWithShape="1">
-          <a:blip r:embed="rId2">
-            <a:lum/>
-          </a:blip>
-          <a:srcRect/>
-          <a:stretch>
-            <a:fillRect/>
-          </a:stretch>
-        </a:blipFill>
-        <a:effectLst/>
-      </p:bgPr>
-    </p:bg>
     <p:spTree>
       <p:nvGrpSpPr>
         <p:cNvPr id="1" name=""/>
@@ -14978,7 +15014,7 @@
               </a:pPr>
               <a:r>
                 <a:rPr lang="en-AU" sz="1200" dirty="0"/>
-                <a:t>  </a:t>
+                <a:t>    </a:t>
               </a:r>
               <a:r>
                 <a:rPr lang="en-AU" sz="1200" dirty="0" err="1"/>
@@ -15002,7 +15038,7 @@
                     </a:schemeClr>
                   </a:solidFill>
                 </a:rPr>
-                <a:t>  </a:t>
+                <a:t>    </a:t>
               </a:r>
               <a:r>
                 <a:rPr lang="en-AU" sz="1200" dirty="0" err="1">
@@ -15038,7 +15074,7 @@
                     </a:schemeClr>
                   </a:solidFill>
                 </a:rPr>
-                <a:t>  return 0;</a:t>
+                <a:t>    return 0;</a:t>
               </a:r>
             </a:p>
             <a:p>
@@ -15129,7 +15165,7 @@
               </a:pPr>
               <a:r>
                 <a:rPr lang="en-AU" sz="1200" dirty="0"/>
-                <a:t>  double solution = m * x + c;</a:t>
+                <a:t>    double solution = m * x + c;</a:t>
               </a:r>
             </a:p>
             <a:p>
@@ -15145,7 +15181,7 @@
                     </a:schemeClr>
                   </a:solidFill>
                 </a:rPr>
-                <a:t>  </a:t>
+                <a:t>    </a:t>
               </a:r>
               <a:r>
                 <a:rPr lang="en-AU" sz="1200" dirty="0" err="1">
@@ -15225,7 +15261,26 @@
                     </a:schemeClr>
                   </a:solidFill>
                 </a:rPr>
-                <a:t>(c) + " = " + </a:t>
+                <a:t>(c) + " = </a:t>
+              </a:r>
+              <a:br>
+                <a:rPr lang="en-AU" sz="1200" dirty="0">
+                  <a:solidFill>
+                    <a:schemeClr val="bg1">
+                      <a:lumMod val="65000"/>
+                    </a:schemeClr>
+                  </a:solidFill>
+                </a:rPr>
+              </a:br>
+              <a:r>
+                <a:rPr lang="en-AU" sz="1200" dirty="0">
+                  <a:solidFill>
+                    <a:schemeClr val="bg1">
+                      <a:lumMod val="65000"/>
+                    </a:schemeClr>
+                  </a:solidFill>
+                </a:rPr>
+                <a:t>    " + </a:t>
               </a:r>
               <a:r>
                 <a:rPr lang="en-AU" sz="1200" dirty="0" err="1">
@@ -15301,7 +15356,7 @@
               <p:nvPr/>
             </p:nvPicPr>
             <p:blipFill>
-              <a:blip r:embed="rId3">
+              <a:blip r:embed="rId2">
                 <a:alphaModFix/>
               </a:blip>
               <a:stretch>
@@ -17101,7 +17156,7 @@
             <p:nvPr/>
           </p:nvPicPr>
           <p:blipFill>
-            <a:blip r:embed="rId4">
+            <a:blip r:embed="rId3">
               <a:alphaModFix amt="30000"/>
             </a:blip>
             <a:stretch>
@@ -18277,20 +18332,6 @@
 <file path=ppt/slides/slide4.xml><?xml version="1.0" encoding="utf-8"?>
 <p:sld xmlns:a="http://schemas.openxmlformats.org/drawingml/2006/main" xmlns:r="http://schemas.openxmlformats.org/officeDocument/2006/relationships" xmlns:p="http://schemas.openxmlformats.org/presentationml/2006/main">
   <p:cSld>
-    <p:bg>
-      <p:bgPr>
-        <a:blipFill dpi="0" rotWithShape="1">
-          <a:blip r:embed="rId2">
-            <a:lum/>
-          </a:blip>
-          <a:srcRect/>
-          <a:stretch>
-            <a:fillRect/>
-          </a:stretch>
-        </a:blipFill>
-        <a:effectLst/>
-      </p:bgPr>
-    </p:bg>
     <p:spTree>
       <p:nvGrpSpPr>
         <p:cNvPr id="1" name=""/>
@@ -18391,7 +18432,7 @@
               </a:pPr>
               <a:r>
                 <a:rPr lang="en-AU" sz="1200" dirty="0"/>
-                <a:t>  </a:t>
+                <a:t>    </a:t>
               </a:r>
               <a:r>
                 <a:rPr lang="en-AU" sz="1200" dirty="0" err="1"/>
@@ -18415,7 +18456,7 @@
                     </a:schemeClr>
                   </a:solidFill>
                 </a:rPr>
-                <a:t>  </a:t>
+                <a:t>    </a:t>
               </a:r>
               <a:r>
                 <a:rPr lang="en-AU" sz="1200" dirty="0" err="1">
@@ -18451,7 +18492,7 @@
                     </a:schemeClr>
                   </a:solidFill>
                 </a:rPr>
-                <a:t>  return 0;</a:t>
+                <a:t>    return 0;</a:t>
               </a:r>
             </a:p>
             <a:p>
@@ -18548,7 +18589,7 @@
                     </a:schemeClr>
                   </a:solidFill>
                 </a:rPr>
-                <a:t>  double solution = m * x + c;</a:t>
+                <a:t>    double solution = m * x + c;</a:t>
               </a:r>
             </a:p>
             <a:p>
@@ -18558,7 +18599,7 @@
               </a:pPr>
               <a:r>
                 <a:rPr lang="en-AU" sz="1200" dirty="0"/>
-                <a:t>  </a:t>
+                <a:t>    </a:t>
               </a:r>
               <a:r>
                 <a:rPr lang="en-AU" sz="1200" dirty="0" err="1"/>
@@ -18590,7 +18631,14 @@
               </a:r>
               <a:r>
                 <a:rPr lang="en-AU" sz="1200" dirty="0"/>
-                <a:t>(c) + " = " + </a:t>
+                <a:t>(c) + " = </a:t>
+              </a:r>
+              <a:br>
+                <a:rPr lang="en-AU" sz="1200" dirty="0"/>
+              </a:br>
+              <a:r>
+                <a:rPr lang="en-AU" sz="1200" dirty="0"/>
+                <a:t>    " + </a:t>
               </a:r>
               <a:r>
                 <a:rPr lang="en-AU" sz="1200" dirty="0" err="1"/>
@@ -18654,7 +18702,7 @@
               <p:nvPr/>
             </p:nvPicPr>
             <p:blipFill>
-              <a:blip r:embed="rId3">
+              <a:blip r:embed="rId2">
                 <a:alphaModFix/>
               </a:blip>
               <a:stretch>
@@ -20445,7 +20493,7 @@
             <p:nvPr/>
           </p:nvPicPr>
           <p:blipFill>
-            <a:blip r:embed="rId4">
+            <a:blip r:embed="rId3">
               <a:alphaModFix/>
             </a:blip>
             <a:stretch>
@@ -21606,20 +21654,6 @@
 <file path=ppt/slides/slide5.xml><?xml version="1.0" encoding="utf-8"?>
 <p:sld xmlns:a="http://schemas.openxmlformats.org/drawingml/2006/main" xmlns:r="http://schemas.openxmlformats.org/officeDocument/2006/relationships" xmlns:p="http://schemas.openxmlformats.org/presentationml/2006/main">
   <p:cSld>
-    <p:bg>
-      <p:bgPr>
-        <a:blipFill dpi="0" rotWithShape="1">
-          <a:blip r:embed="rId2">
-            <a:lum/>
-          </a:blip>
-          <a:srcRect/>
-          <a:stretch>
-            <a:fillRect/>
-          </a:stretch>
-        </a:blipFill>
-        <a:effectLst/>
-      </p:bgPr>
-    </p:bg>
     <p:spTree>
       <p:nvGrpSpPr>
         <p:cNvPr id="1" name=""/>
@@ -21966,7 +22000,7 @@
               </a:pPr>
               <a:r>
                 <a:rPr lang="en-AU" sz="1200" dirty="0"/>
-                <a:t>  </a:t>
+                <a:t>    </a:t>
               </a:r>
               <a:r>
                 <a:rPr lang="en-AU" sz="1200" dirty="0" err="1"/>
@@ -21990,7 +22024,7 @@
                     </a:schemeClr>
                   </a:solidFill>
                 </a:rPr>
-                <a:t>  </a:t>
+                <a:t>    </a:t>
               </a:r>
               <a:r>
                 <a:rPr lang="en-AU" sz="1200" dirty="0" err="1">
@@ -22026,7 +22060,7 @@
                     </a:schemeClr>
                   </a:solidFill>
                 </a:rPr>
-                <a:t>  return 0;</a:t>
+                <a:t>    return 0;</a:t>
               </a:r>
             </a:p>
             <a:p>
@@ -22123,7 +22157,7 @@
                     </a:schemeClr>
                   </a:solidFill>
                 </a:rPr>
-                <a:t>  double solution = m * x + c;</a:t>
+                <a:t>    double solution = m * x + c;</a:t>
               </a:r>
             </a:p>
             <a:p>
@@ -22139,7 +22173,7 @@
                     </a:schemeClr>
                   </a:solidFill>
                 </a:rPr>
-                <a:t>  </a:t>
+                <a:t>    </a:t>
               </a:r>
               <a:r>
                 <a:rPr lang="en-AU" sz="1200" dirty="0" err="1">
@@ -22219,7 +22253,26 @@
                     </a:schemeClr>
                   </a:solidFill>
                 </a:rPr>
-                <a:t>(c) + " = " + </a:t>
+                <a:t>(c) + " = </a:t>
+              </a:r>
+              <a:br>
+                <a:rPr lang="en-AU" sz="1200" dirty="0">
+                  <a:solidFill>
+                    <a:schemeClr val="bg1">
+                      <a:lumMod val="65000"/>
+                    </a:schemeClr>
+                  </a:solidFill>
+                </a:rPr>
+              </a:br>
+              <a:r>
+                <a:rPr lang="en-AU" sz="1200" dirty="0">
+                  <a:solidFill>
+                    <a:schemeClr val="bg1">
+                      <a:lumMod val="65000"/>
+                    </a:schemeClr>
+                  </a:solidFill>
+                </a:rPr>
+                <a:t>    " + </a:t>
               </a:r>
               <a:r>
                 <a:rPr lang="en-AU" sz="1200" dirty="0" err="1">
@@ -22289,7 +22342,7 @@
               <p:nvPr/>
             </p:nvPicPr>
             <p:blipFill>
-              <a:blip r:embed="rId3">
+              <a:blip r:embed="rId2">
                 <a:alphaModFix/>
               </a:blip>
               <a:stretch>
@@ -24069,7 +24122,7 @@
             <a:p>
               <a:r>
                 <a:rPr lang="en-US" dirty="0"/>
-                <a:t>4</a:t>
+                <a:t>3,4</a:t>
               </a:r>
             </a:p>
           </p:txBody>
@@ -24089,7 +24142,7 @@
             <p:nvPr/>
           </p:nvPicPr>
           <p:blipFill>
-            <a:blip r:embed="rId4">
+            <a:blip r:embed="rId3">
               <a:alphaModFix amt="30000"/>
             </a:blip>
             <a:stretch>
@@ -25318,20 +25371,6 @@
 <file path=ppt/slides/slide6.xml><?xml version="1.0" encoding="utf-8"?>
 <p:sld xmlns:a="http://schemas.openxmlformats.org/drawingml/2006/main" xmlns:r="http://schemas.openxmlformats.org/officeDocument/2006/relationships" xmlns:p="http://schemas.openxmlformats.org/presentationml/2006/main">
   <p:cSld>
-    <p:bg>
-      <p:bgPr>
-        <a:blipFill dpi="0" rotWithShape="1">
-          <a:blip r:embed="rId2">
-            <a:lum/>
-          </a:blip>
-          <a:srcRect/>
-          <a:stretch>
-            <a:fillRect/>
-          </a:stretch>
-        </a:blipFill>
-        <a:effectLst/>
-      </p:bgPr>
-    </p:bg>
     <p:spTree>
       <p:nvGrpSpPr>
         <p:cNvPr id="1" name=""/>
@@ -25438,7 +25477,7 @@
                     </a:schemeClr>
                   </a:solidFill>
                 </a:rPr>
-                <a:t>  </a:t>
+                <a:t>    </a:t>
               </a:r>
               <a:r>
                 <a:rPr lang="en-AU" sz="1200" dirty="0" err="1">
@@ -25468,7 +25507,7 @@
               </a:pPr>
               <a:r>
                 <a:rPr lang="en-AU" sz="1200" dirty="0"/>
-                <a:t>  </a:t>
+                <a:t>    </a:t>
               </a:r>
               <a:r>
                 <a:rPr lang="en-AU" sz="1200" dirty="0" err="1"/>
@@ -25492,7 +25531,7 @@
                     </a:schemeClr>
                   </a:solidFill>
                 </a:rPr>
-                <a:t>  return 0;</a:t>
+                <a:t>    return 0;</a:t>
               </a:r>
             </a:p>
             <a:p>
@@ -25589,7 +25628,7 @@
                     </a:schemeClr>
                   </a:solidFill>
                 </a:rPr>
-                <a:t>  double solution = m * x + c;</a:t>
+                <a:t>    double solution = m * x + c;</a:t>
               </a:r>
             </a:p>
             <a:p>
@@ -25605,7 +25644,7 @@
                     </a:schemeClr>
                   </a:solidFill>
                 </a:rPr>
-                <a:t>  </a:t>
+                <a:t>    </a:t>
               </a:r>
               <a:r>
                 <a:rPr lang="en-AU" sz="1200" dirty="0" err="1">
@@ -25685,7 +25724,26 @@
                     </a:schemeClr>
                   </a:solidFill>
                 </a:rPr>
-                <a:t>(c) + " = " + </a:t>
+                <a:t>(c) + " = </a:t>
+              </a:r>
+              <a:br>
+                <a:rPr lang="en-AU" sz="1200" dirty="0">
+                  <a:solidFill>
+                    <a:schemeClr val="bg1">
+                      <a:lumMod val="65000"/>
+                    </a:schemeClr>
+                  </a:solidFill>
+                </a:rPr>
+              </a:br>
+              <a:r>
+                <a:rPr lang="en-AU" sz="1200" dirty="0">
+                  <a:solidFill>
+                    <a:schemeClr val="bg1">
+                      <a:lumMod val="65000"/>
+                    </a:schemeClr>
+                  </a:solidFill>
+                </a:rPr>
+                <a:t>    " + </a:t>
               </a:r>
               <a:r>
                 <a:rPr lang="en-AU" sz="1200" dirty="0" err="1">
@@ -25761,7 +25819,7 @@
               <p:nvPr/>
             </p:nvPicPr>
             <p:blipFill>
-              <a:blip r:embed="rId3">
+              <a:blip r:embed="rId2">
                 <a:alphaModFix/>
               </a:blip>
               <a:stretch>
@@ -27541,7 +27599,7 @@
             <a:p>
               <a:r>
                 <a:rPr lang="en-US" dirty="0"/>
-                <a:t>7,8</a:t>
+                <a:t>7</a:t>
               </a:r>
             </a:p>
           </p:txBody>
@@ -27561,7 +27619,7 @@
             <p:nvPr/>
           </p:nvPicPr>
           <p:blipFill>
-            <a:blip r:embed="rId4">
+            <a:blip r:embed="rId3">
               <a:alphaModFix amt="30000"/>
             </a:blip>
             <a:stretch>
@@ -27792,20 +27850,6 @@
 <file path=ppt/slides/slide7.xml><?xml version="1.0" encoding="utf-8"?>
 <p:sld xmlns:a="http://schemas.openxmlformats.org/drawingml/2006/main" xmlns:r="http://schemas.openxmlformats.org/officeDocument/2006/relationships" xmlns:p="http://schemas.openxmlformats.org/presentationml/2006/main">
   <p:cSld>
-    <p:bg>
-      <p:bgPr>
-        <a:blipFill dpi="0" rotWithShape="1">
-          <a:blip r:embed="rId2">
-            <a:lum/>
-          </a:blip>
-          <a:srcRect/>
-          <a:stretch>
-            <a:fillRect/>
-          </a:stretch>
-        </a:blipFill>
-        <a:effectLst/>
-      </p:bgPr>
-    </p:bg>
     <p:spTree>
       <p:nvGrpSpPr>
         <p:cNvPr id="1" name=""/>
@@ -27912,7 +27956,7 @@
                     </a:schemeClr>
                   </a:solidFill>
                 </a:rPr>
-                <a:t>  </a:t>
+                <a:t>    </a:t>
               </a:r>
               <a:r>
                 <a:rPr lang="en-AU" sz="1200" dirty="0" err="1">
@@ -27942,7 +27986,7 @@
               </a:pPr>
               <a:r>
                 <a:rPr lang="en-AU" sz="1200" dirty="0"/>
-                <a:t>  </a:t>
+                <a:t>    </a:t>
               </a:r>
               <a:r>
                 <a:rPr lang="en-AU" sz="1200" dirty="0" err="1"/>
@@ -27966,7 +28010,7 @@
                     </a:schemeClr>
                   </a:solidFill>
                 </a:rPr>
-                <a:t>  return 0;</a:t>
+                <a:t>    return 0;</a:t>
               </a:r>
             </a:p>
             <a:p>
@@ -28039,7 +28083,7 @@
                     </a:schemeClr>
                   </a:solidFill>
                 </a:rPr>
-                <a:t>  double solution = m * x + c;</a:t>
+                <a:t>    double solution = m * x + c;</a:t>
               </a:r>
             </a:p>
             <a:p>
@@ -28055,7 +28099,7 @@
                     </a:schemeClr>
                   </a:solidFill>
                 </a:rPr>
-                <a:t>  </a:t>
+                <a:t>    </a:t>
               </a:r>
               <a:r>
                 <a:rPr lang="en-AU" sz="1200" dirty="0" err="1">
@@ -28135,7 +28179,26 @@
                     </a:schemeClr>
                   </a:solidFill>
                 </a:rPr>
-                <a:t>(c) + " = " + </a:t>
+                <a:t>(c) + " = </a:t>
+              </a:r>
+              <a:br>
+                <a:rPr lang="en-AU" sz="1200" dirty="0">
+                  <a:solidFill>
+                    <a:schemeClr val="bg1">
+                      <a:lumMod val="65000"/>
+                    </a:schemeClr>
+                  </a:solidFill>
+                </a:rPr>
+              </a:br>
+              <a:r>
+                <a:rPr lang="en-AU" sz="1200" dirty="0">
+                  <a:solidFill>
+                    <a:schemeClr val="bg1">
+                      <a:lumMod val="65000"/>
+                    </a:schemeClr>
+                  </a:solidFill>
+                </a:rPr>
+                <a:t>    " + </a:t>
               </a:r>
               <a:r>
                 <a:rPr lang="en-AU" sz="1200" dirty="0" err="1">
@@ -28211,7 +28274,7 @@
               <p:nvPr/>
             </p:nvPicPr>
             <p:blipFill>
-              <a:blip r:embed="rId3">
+              <a:blip r:embed="rId2">
                 <a:alphaModFix/>
               </a:blip>
               <a:stretch>
@@ -29663,7 +29726,7 @@
               <a:pPr algn="ctr"/>
               <a:r>
                 <a:rPr lang="en-US" dirty="0"/>
-                <a:t>7,8</a:t>
+                <a:t>7</a:t>
               </a:r>
             </a:p>
           </p:txBody>
@@ -29991,7 +30054,7 @@
             <a:p>
               <a:r>
                 <a:rPr lang="en-US" dirty="0"/>
-                <a:t>9</a:t>
+                <a:t>8,9</a:t>
               </a:r>
             </a:p>
           </p:txBody>
@@ -30011,7 +30074,7 @@
             <p:nvPr/>
           </p:nvPicPr>
           <p:blipFill>
-            <a:blip r:embed="rId4">
+            <a:blip r:embed="rId3">
               <a:alphaModFix amt="30000"/>
             </a:blip>
             <a:stretch>
@@ -31087,20 +31150,6 @@
 <file path=ppt/slides/slide8.xml><?xml version="1.0" encoding="utf-8"?>
 <p:sld xmlns:a="http://schemas.openxmlformats.org/drawingml/2006/main" xmlns:r="http://schemas.openxmlformats.org/officeDocument/2006/relationships" xmlns:p="http://schemas.openxmlformats.org/presentationml/2006/main">
   <p:cSld>
-    <p:bg>
-      <p:bgPr>
-        <a:blipFill dpi="0" rotWithShape="1">
-          <a:blip r:embed="rId2">
-            <a:lum/>
-          </a:blip>
-          <a:srcRect/>
-          <a:stretch>
-            <a:fillRect/>
-          </a:stretch>
-        </a:blipFill>
-        <a:effectLst/>
-      </p:bgPr>
-    </p:bg>
     <p:spTree>
       <p:nvGrpSpPr>
         <p:cNvPr id="1" name=""/>
@@ -31207,7 +31256,7 @@
                     </a:schemeClr>
                   </a:solidFill>
                 </a:rPr>
-                <a:t>  </a:t>
+                <a:t>    </a:t>
               </a:r>
               <a:r>
                 <a:rPr lang="en-AU" sz="1200" dirty="0" err="1">
@@ -31237,7 +31286,7 @@
               </a:pPr>
               <a:r>
                 <a:rPr lang="en-AU" sz="1200" dirty="0"/>
-                <a:t>  </a:t>
+                <a:t>    </a:t>
               </a:r>
               <a:r>
                 <a:rPr lang="en-AU" sz="1200" dirty="0" err="1"/>
@@ -31261,7 +31310,7 @@
                     </a:schemeClr>
                   </a:solidFill>
                 </a:rPr>
-                <a:t>  return 0;</a:t>
+                <a:t>    return 0;</a:t>
               </a:r>
             </a:p>
             <a:p>
@@ -31352,7 +31401,7 @@
               </a:pPr>
               <a:r>
                 <a:rPr lang="en-AU" sz="1200" dirty="0"/>
-                <a:t>  double solution = m * x + c;</a:t>
+                <a:t>    double solution = m * x + c;</a:t>
               </a:r>
             </a:p>
             <a:p>
@@ -31368,7 +31417,7 @@
                     </a:schemeClr>
                   </a:solidFill>
                 </a:rPr>
-                <a:t>  </a:t>
+                <a:t>    </a:t>
               </a:r>
               <a:r>
                 <a:rPr lang="en-AU" sz="1200" dirty="0" err="1">
@@ -31448,7 +31497,26 @@
                     </a:schemeClr>
                   </a:solidFill>
                 </a:rPr>
-                <a:t>(c) + " = " + </a:t>
+                <a:t>(c) + " = </a:t>
+              </a:r>
+              <a:br>
+                <a:rPr lang="en-AU" sz="1200" dirty="0">
+                  <a:solidFill>
+                    <a:schemeClr val="bg1">
+                      <a:lumMod val="65000"/>
+                    </a:schemeClr>
+                  </a:solidFill>
+                </a:rPr>
+              </a:br>
+              <a:r>
+                <a:rPr lang="en-AU" sz="1200" dirty="0">
+                  <a:solidFill>
+                    <a:schemeClr val="bg1">
+                      <a:lumMod val="65000"/>
+                    </a:schemeClr>
+                  </a:solidFill>
+                </a:rPr>
+                <a:t>    " + </a:t>
               </a:r>
               <a:r>
                 <a:rPr lang="en-AU" sz="1200" dirty="0" err="1">
@@ -31524,7 +31592,7 @@
               <p:nvPr/>
             </p:nvPicPr>
             <p:blipFill>
-              <a:blip r:embed="rId3">
+              <a:blip r:embed="rId2">
                 <a:alphaModFix/>
               </a:blip>
               <a:stretch>
@@ -33324,7 +33392,7 @@
             <p:nvPr/>
           </p:nvPicPr>
           <p:blipFill>
-            <a:blip r:embed="rId4">
+            <a:blip r:embed="rId3">
               <a:alphaModFix amt="30000"/>
             </a:blip>
             <a:stretch>
@@ -34541,20 +34609,6 @@
 <file path=ppt/slides/slide9.xml><?xml version="1.0" encoding="utf-8"?>
 <p:sld xmlns:a="http://schemas.openxmlformats.org/drawingml/2006/main" xmlns:r="http://schemas.openxmlformats.org/officeDocument/2006/relationships" xmlns:p="http://schemas.openxmlformats.org/presentationml/2006/main">
   <p:cSld>
-    <p:bg>
-      <p:bgPr>
-        <a:blipFill dpi="0" rotWithShape="1">
-          <a:blip r:embed="rId2">
-            <a:lum/>
-          </a:blip>
-          <a:srcRect/>
-          <a:stretch>
-            <a:fillRect/>
-          </a:stretch>
-        </a:blipFill>
-        <a:effectLst/>
-      </p:bgPr>
-    </p:bg>
     <p:spTree>
       <p:nvGrpSpPr>
         <p:cNvPr id="1" name=""/>
@@ -34661,7 +34715,7 @@
                     </a:schemeClr>
                   </a:solidFill>
                 </a:rPr>
-                <a:t>  </a:t>
+                <a:t>    </a:t>
               </a:r>
               <a:r>
                 <a:rPr lang="en-AU" sz="1200" dirty="0" err="1">
@@ -34691,7 +34745,7 @@
               </a:pPr>
               <a:r>
                 <a:rPr lang="en-AU" sz="1200" dirty="0"/>
-                <a:t>  </a:t>
+                <a:t>    </a:t>
               </a:r>
               <a:r>
                 <a:rPr lang="en-AU" sz="1200" dirty="0" err="1"/>
@@ -34715,7 +34769,7 @@
                     </a:schemeClr>
                   </a:solidFill>
                 </a:rPr>
-                <a:t>  return 0;</a:t>
+                <a:t>    return 0;</a:t>
               </a:r>
             </a:p>
             <a:p>
@@ -34812,7 +34866,7 @@
                     </a:schemeClr>
                   </a:solidFill>
                 </a:rPr>
-                <a:t>  double solution = m * x + c;</a:t>
+                <a:t>    double solution = m * x + c;</a:t>
               </a:r>
             </a:p>
             <a:p>
@@ -34822,7 +34876,7 @@
               </a:pPr>
               <a:r>
                 <a:rPr lang="en-AU" sz="1200" dirty="0"/>
-                <a:t>  </a:t>
+                <a:t>    </a:t>
               </a:r>
               <a:r>
                 <a:rPr lang="en-AU" sz="1200" dirty="0" err="1"/>
@@ -34854,7 +34908,14 @@
               </a:r>
               <a:r>
                 <a:rPr lang="en-AU" sz="1200" dirty="0"/>
-                <a:t>(c) + " = " + </a:t>
+                <a:t>(c) + " = </a:t>
+              </a:r>
+              <a:br>
+                <a:rPr lang="en-AU" sz="1200" dirty="0"/>
+              </a:br>
+              <a:r>
+                <a:rPr lang="en-AU" sz="1200" dirty="0"/>
+                <a:t>    " + </a:t>
               </a:r>
               <a:r>
                 <a:rPr lang="en-AU" sz="1200" dirty="0" err="1"/>
@@ -34918,7 +34979,7 @@
               <p:nvPr/>
             </p:nvPicPr>
             <p:blipFill>
-              <a:blip r:embed="rId3">
+              <a:blip r:embed="rId2">
                 <a:alphaModFix/>
               </a:blip>
               <a:stretch>
@@ -36709,7 +36770,7 @@
             <p:nvPr/>
           </p:nvPicPr>
           <p:blipFill>
-            <a:blip r:embed="rId4">
+            <a:blip r:embed="rId3">
               <a:alphaModFix/>
             </a:blip>
             <a:stretch>

</xml_diff>